<commit_message>
small edits to Intro2CLI
</commit_message>
<xml_diff>
--- a/monday/Intro2CLI.pptx
+++ b/monday/Intro2CLI.pptx
@@ -5,7 +5,7 @@
     <p:sldMasterId id="2147483660" r:id="rId1"/>
   </p:sldMasterIdLst>
   <p:notesMasterIdLst>
-    <p:notesMasterId r:id="rId17"/>
+    <p:notesMasterId r:id="rId16"/>
   </p:notesMasterIdLst>
   <p:sldIdLst>
     <p:sldId id="256" r:id="rId2"/>
@@ -22,7 +22,6 @@
     <p:sldId id="306" r:id="rId13"/>
     <p:sldId id="304" r:id="rId14"/>
     <p:sldId id="305" r:id="rId15"/>
-    <p:sldId id="294" r:id="rId16"/>
   </p:sldIdLst>
   <p:sldSz cx="12192000" cy="6858000"/>
   <p:notesSz cx="6858000" cy="9144000"/>
@@ -211,7 +210,7 @@
           <a:p>
             <a:fld id="{CDED407C-CC8A-8645-9ECD-06C0DAAD93D3}" type="datetimeFigureOut">
               <a:rPr lang="en-US" smtClean="0"/>
-              <a:t>6/7/18</a:t>
+              <a:t>6/18/18</a:t>
             </a:fld>
             <a:endParaRPr lang="en-US"/>
           </a:p>
@@ -607,7 +606,7 @@
           <a:p>
             <a:fld id="{260916BB-F00A-684B-8519-B8B59194C693}" type="datetimeFigureOut">
               <a:rPr lang="en-US" smtClean="0"/>
-              <a:t>6/7/18</a:t>
+              <a:t>6/18/18</a:t>
             </a:fld>
             <a:endParaRPr lang="en-US"/>
           </a:p>
@@ -771,7 +770,7 @@
           <a:p>
             <a:fld id="{260916BB-F00A-684B-8519-B8B59194C693}" type="datetimeFigureOut">
               <a:rPr lang="en-US" smtClean="0"/>
-              <a:t>6/7/18</a:t>
+              <a:t>6/18/18</a:t>
             </a:fld>
             <a:endParaRPr lang="en-US"/>
           </a:p>
@@ -945,7 +944,7 @@
           <a:p>
             <a:fld id="{260916BB-F00A-684B-8519-B8B59194C693}" type="datetimeFigureOut">
               <a:rPr lang="en-US" smtClean="0"/>
-              <a:t>6/7/18</a:t>
+              <a:t>6/18/18</a:t>
             </a:fld>
             <a:endParaRPr lang="en-US"/>
           </a:p>
@@ -1109,7 +1108,7 @@
           <a:p>
             <a:fld id="{260916BB-F00A-684B-8519-B8B59194C693}" type="datetimeFigureOut">
               <a:rPr lang="en-US" smtClean="0"/>
-              <a:t>6/8/18</a:t>
+              <a:t>6/18/18</a:t>
             </a:fld>
             <a:endParaRPr lang="en-US"/>
           </a:p>
@@ -1350,7 +1349,7 @@
           <a:p>
             <a:fld id="{260916BB-F00A-684B-8519-B8B59194C693}" type="datetimeFigureOut">
               <a:rPr lang="en-US" smtClean="0"/>
-              <a:t>6/7/18</a:t>
+              <a:t>6/18/18</a:t>
             </a:fld>
             <a:endParaRPr lang="en-US"/>
           </a:p>
@@ -1575,7 +1574,7 @@
           <a:p>
             <a:fld id="{260916BB-F00A-684B-8519-B8B59194C693}" type="datetimeFigureOut">
               <a:rPr lang="en-US" smtClean="0"/>
-              <a:t>6/7/18</a:t>
+              <a:t>6/18/18</a:t>
             </a:fld>
             <a:endParaRPr lang="en-US"/>
           </a:p>
@@ -1935,7 +1934,7 @@
           <a:p>
             <a:fld id="{260916BB-F00A-684B-8519-B8B59194C693}" type="datetimeFigureOut">
               <a:rPr lang="en-US" smtClean="0"/>
-              <a:t>6/7/18</a:t>
+              <a:t>6/18/18</a:t>
             </a:fld>
             <a:endParaRPr lang="en-US"/>
           </a:p>
@@ -2048,7 +2047,7 @@
           <a:p>
             <a:fld id="{260916BB-F00A-684B-8519-B8B59194C693}" type="datetimeFigureOut">
               <a:rPr lang="en-US" smtClean="0"/>
-              <a:t>6/7/18</a:t>
+              <a:t>6/18/18</a:t>
             </a:fld>
             <a:endParaRPr lang="en-US"/>
           </a:p>
@@ -2139,7 +2138,7 @@
           <a:p>
             <a:fld id="{260916BB-F00A-684B-8519-B8B59194C693}" type="datetimeFigureOut">
               <a:rPr lang="en-US" smtClean="0"/>
-              <a:t>6/7/18</a:t>
+              <a:t>6/18/18</a:t>
             </a:fld>
             <a:endParaRPr lang="en-US"/>
           </a:p>
@@ -2410,7 +2409,7 @@
           <a:p>
             <a:fld id="{260916BB-F00A-684B-8519-B8B59194C693}" type="datetimeFigureOut">
               <a:rPr lang="en-US" smtClean="0"/>
-              <a:t>6/7/18</a:t>
+              <a:t>6/18/18</a:t>
             </a:fld>
             <a:endParaRPr lang="en-US"/>
           </a:p>
@@ -2661,7 +2660,7 @@
           <a:p>
             <a:fld id="{260916BB-F00A-684B-8519-B8B59194C693}" type="datetimeFigureOut">
               <a:rPr lang="en-US" smtClean="0"/>
-              <a:t>6/7/18</a:t>
+              <a:t>6/18/18</a:t>
             </a:fld>
             <a:endParaRPr lang="en-US"/>
           </a:p>
@@ -2869,7 +2868,7 @@
           <a:p>
             <a:fld id="{260916BB-F00A-684B-8519-B8B59194C693}" type="datetimeFigureOut">
               <a:rPr lang="en-US" smtClean="0"/>
-              <a:t>6/7/18</a:t>
+              <a:t>6/18/18</a:t>
             </a:fld>
             <a:endParaRPr lang="en-US"/>
           </a:p>
@@ -3394,7 +3393,7 @@
         </p:spPr>
         <p:txBody>
           <a:bodyPr>
-            <a:normAutofit fontScale="77500" lnSpcReduction="20000"/>
+            <a:normAutofit/>
           </a:bodyPr>
           <a:lstStyle/>
           <a:p>
@@ -3420,33 +3419,6 @@
                 <a:cs typeface="Times New Roman" panose="02020603050405020304" pitchFamily="18" charset="0"/>
               </a:rPr>
               <a:t>UC Davis Bioinformatics Core</a:t>
-            </a:r>
-          </a:p>
-          <a:p>
-            <a:r>
-              <a:rPr lang="en-US" dirty="0">
-                <a:latin typeface="Times New Roman" panose="02020603050405020304" pitchFamily="18" charset="0"/>
-                <a:cs typeface="Times New Roman" panose="02020603050405020304" pitchFamily="18" charset="0"/>
-              </a:rPr>
-              <a:t> 10X Workshop</a:t>
-            </a:r>
-          </a:p>
-          <a:p>
-            <a:r>
-              <a:rPr lang="en-US" dirty="0">
-                <a:latin typeface="Times New Roman" panose="02020603050405020304" pitchFamily="18" charset="0"/>
-                <a:cs typeface="Times New Roman" panose="02020603050405020304" pitchFamily="18" charset="0"/>
-              </a:rPr>
-              <a:t>PAG Asia</a:t>
-            </a:r>
-          </a:p>
-          <a:p>
-            <a:r>
-              <a:rPr lang="en-US" dirty="0">
-                <a:latin typeface="Times New Roman" panose="02020603050405020304" pitchFamily="18" charset="0"/>
-                <a:cs typeface="Times New Roman" panose="02020603050405020304" pitchFamily="18" charset="0"/>
-              </a:rPr>
-              <a:t>May 30, 2018</a:t>
             </a:r>
           </a:p>
         </p:txBody>
@@ -4448,7 +4420,7 @@
             </a:r>
             <a:r>
               <a:rPr lang="en-US" dirty="0"/>
-              <a:t> based locations</a:t>
+              <a:t> (command line) based locations</a:t>
             </a:r>
           </a:p>
           <a:p>
@@ -4512,7 +4484,7 @@
           <a:p>
             <a:r>
               <a:rPr lang="en-US" dirty="0"/>
-              <a:t>On Windows machines</a:t>
+              <a:t>On Windows/Mac machines</a:t>
             </a:r>
           </a:p>
           <a:p>
@@ -4527,6 +4499,14 @@
             <a:r>
               <a:rPr lang="en-US" dirty="0" err="1"/>
               <a:t>Filezilla</a:t>
+            </a:r>
+            <a:endParaRPr lang="en-US" dirty="0"/>
+          </a:p>
+          <a:p>
+            <a:pPr lvl="1"/>
+            <a:r>
+              <a:rPr lang="en-US" dirty="0" err="1"/>
+              <a:t>Cyberduck</a:t>
             </a:r>
             <a:endParaRPr lang="en-US" dirty="0"/>
           </a:p>
@@ -4543,2434 +4523,6 @@
     <p:extLst>
       <p:ext uri="{BB962C8B-B14F-4D97-AF65-F5344CB8AC3E}">
         <p14:creationId xmlns:p14="http://schemas.microsoft.com/office/powerpoint/2010/main" val="992646881"/>
-      </p:ext>
-    </p:extLst>
-  </p:cSld>
-  <p:clrMapOvr>
-    <a:masterClrMapping/>
-  </p:clrMapOvr>
-</p:sld>
-</file>
-
-<file path=ppt/slides/slide15.xml><?xml version="1.0" encoding="utf-8"?>
-<p:sld xmlns:a="http://schemas.openxmlformats.org/drawingml/2006/main" xmlns:r="http://schemas.openxmlformats.org/officeDocument/2006/relationships" xmlns:p="http://schemas.openxmlformats.org/presentationml/2006/main">
-  <p:cSld>
-    <p:spTree>
-      <p:nvGrpSpPr>
-        <p:cNvPr id="1" name=""/>
-        <p:cNvGrpSpPr/>
-        <p:nvPr/>
-      </p:nvGrpSpPr>
-      <p:grpSpPr>
-        <a:xfrm>
-          <a:off x="0" y="0"/>
-          <a:ext cx="0" cy="0"/>
-          <a:chOff x="0" y="0"/>
-          <a:chExt cx="0" cy="0"/>
-        </a:xfrm>
-      </p:grpSpPr>
-      <p:sp>
-        <p:nvSpPr>
-          <p:cNvPr id="2" name="Title 1"/>
-          <p:cNvSpPr>
-            <a:spLocks noGrp="1"/>
-          </p:cNvSpPr>
-          <p:nvPr>
-            <p:ph type="title"/>
-          </p:nvPr>
-        </p:nvSpPr>
-        <p:spPr/>
-        <p:txBody>
-          <a:bodyPr>
-            <a:noAutofit/>
-          </a:bodyPr>
-          <a:lstStyle/>
-          <a:p>
-            <a:r>
-              <a:rPr lang="en-US" sz="2800" dirty="0"/>
-              <a:t>The </a:t>
-            </a:r>
-            <a:r>
-              <a:rPr lang="en-US" sz="2800" b="1" dirty="0"/>
-              <a:t>mission</a:t>
-            </a:r>
-            <a:r>
-              <a:rPr lang="en-US" sz="2800" dirty="0"/>
-              <a:t> of the Bioinformatics Core facility is to facilitate outstanding omics- scale research through these activities:</a:t>
-            </a:r>
-          </a:p>
-        </p:txBody>
-      </p:sp>
-      <p:grpSp>
-        <p:nvGrpSpPr>
-          <p:cNvPr id="4" name="Group 3"/>
-          <p:cNvGrpSpPr/>
-          <p:nvPr/>
-        </p:nvGrpSpPr>
-        <p:grpSpPr>
-          <a:xfrm>
-            <a:off x="15242336" y="22213134"/>
-            <a:ext cx="5701076" cy="2639303"/>
-            <a:chOff x="35811593" y="7228114"/>
-            <a:chExt cx="7600636" cy="3518702"/>
-          </a:xfrm>
-        </p:grpSpPr>
-        <p:grpSp>
-          <p:nvGrpSpPr>
-            <p:cNvPr id="5" name="Group 4"/>
-            <p:cNvGrpSpPr/>
-            <p:nvPr/>
-          </p:nvGrpSpPr>
-          <p:grpSpPr>
-            <a:xfrm>
-              <a:off x="35843077" y="7228114"/>
-              <a:ext cx="7569152" cy="458112"/>
-              <a:chOff x="35843077" y="7228114"/>
-              <a:chExt cx="6315322" cy="458112"/>
-            </a:xfrm>
-          </p:grpSpPr>
-          <p:sp>
-            <p:nvSpPr>
-              <p:cNvPr id="8" name="TextBox 7"/>
-              <p:cNvSpPr txBox="1"/>
-              <p:nvPr/>
-            </p:nvSpPr>
-            <p:spPr>
-              <a:xfrm>
-                <a:off x="35843077" y="7228114"/>
-                <a:ext cx="6315322" cy="458112"/>
-              </a:xfrm>
-              <a:prstGeom prst="rect">
-                <a:avLst/>
-              </a:prstGeom>
-              <a:noFill/>
-              <a:ln>
-                <a:solidFill>
-                  <a:srgbClr val="002755"/>
-                </a:solidFill>
-              </a:ln>
-            </p:spPr>
-            <p:txBody>
-              <a:bodyPr wrap="square" rtlCol="0">
-                <a:spAutoFit/>
-              </a:bodyPr>
-              <a:lstStyle/>
-              <a:p>
-                <a:endParaRPr lang="en-US" sz="1633" dirty="0"/>
-              </a:p>
-            </p:txBody>
-          </p:sp>
-          <p:sp>
-            <p:nvSpPr>
-              <p:cNvPr id="9" name="TextBox 8"/>
-              <p:cNvSpPr txBox="1"/>
-              <p:nvPr/>
-            </p:nvSpPr>
-            <p:spPr>
-              <a:xfrm>
-                <a:off x="35886620" y="7228114"/>
-                <a:ext cx="6262868" cy="458112"/>
-              </a:xfrm>
-              <a:prstGeom prst="rect">
-                <a:avLst/>
-              </a:prstGeom>
-              <a:solidFill>
-                <a:srgbClr val="002755"/>
-              </a:solidFill>
-            </p:spPr>
-            <p:txBody>
-              <a:bodyPr wrap="square" rtlCol="0">
-                <a:spAutoFit/>
-              </a:bodyPr>
-              <a:lstStyle/>
-              <a:p>
-                <a:endParaRPr lang="en-US" sz="1633" dirty="0"/>
-              </a:p>
-            </p:txBody>
-          </p:sp>
-        </p:grpSp>
-        <p:sp>
-          <p:nvSpPr>
-            <p:cNvPr id="6" name="TextBox 5"/>
-            <p:cNvSpPr txBox="1"/>
-            <p:nvPr/>
-          </p:nvSpPr>
-          <p:spPr>
-            <a:xfrm>
-              <a:off x="35811593" y="7375757"/>
-              <a:ext cx="7589957" cy="1046501"/>
-            </a:xfrm>
-            <a:prstGeom prst="rect">
-              <a:avLst/>
-            </a:prstGeom>
-            <a:noFill/>
-          </p:spPr>
-          <p:txBody>
-            <a:bodyPr wrap="square" rtlCol="0">
-              <a:spAutoFit/>
-            </a:bodyPr>
-            <a:lstStyle/>
-            <a:p>
-              <a:pPr algn="ctr"/>
-              <a:r>
-                <a:rPr lang="en-US" sz="4501" dirty="0">
-                  <a:solidFill>
-                    <a:schemeClr val="bg1"/>
-                  </a:solidFill>
-                </a:rPr>
-                <a:t>Data Analysis</a:t>
-              </a:r>
-            </a:p>
-          </p:txBody>
-        </p:sp>
-        <p:sp>
-          <p:nvSpPr>
-            <p:cNvPr id="7" name="TextBox 6"/>
-            <p:cNvSpPr txBox="1"/>
-            <p:nvPr/>
-          </p:nvSpPr>
-          <p:spPr>
-            <a:xfrm>
-              <a:off x="36060246" y="8961899"/>
-              <a:ext cx="7210673" cy="1784917"/>
-            </a:xfrm>
-            <a:prstGeom prst="rect">
-              <a:avLst/>
-            </a:prstGeom>
-            <a:noFill/>
-          </p:spPr>
-          <p:txBody>
-            <a:bodyPr wrap="square" rtlCol="0">
-              <a:spAutoFit/>
-            </a:bodyPr>
-            <a:lstStyle/>
-            <a:p>
-              <a:pPr algn="ctr"/>
-              <a:r>
-                <a:rPr lang="en-US" sz="2700" b="1" dirty="0">
-                  <a:hlinkClick r:id="rId2"/>
-                </a:rPr>
-                <a:t>Intelligently analyzing data</a:t>
-              </a:r>
-              <a:r>
-                <a:rPr lang="en-US" sz="2700" dirty="0"/>
-                <a:t> from genomics, and other projects, to help drive research forward</a:t>
-              </a:r>
-            </a:p>
-          </p:txBody>
-        </p:sp>
-      </p:grpSp>
-      <p:grpSp>
-        <p:nvGrpSpPr>
-          <p:cNvPr id="10" name="Group 9"/>
-          <p:cNvGrpSpPr/>
-          <p:nvPr/>
-        </p:nvGrpSpPr>
-        <p:grpSpPr>
-          <a:xfrm>
-            <a:off x="22253294" y="22213134"/>
-            <a:ext cx="5721073" cy="2622204"/>
-            <a:chOff x="35837121" y="13317819"/>
-            <a:chExt cx="7627296" cy="3495905"/>
-          </a:xfrm>
-        </p:grpSpPr>
-        <p:grpSp>
-          <p:nvGrpSpPr>
-            <p:cNvPr id="11" name="Group 10"/>
-            <p:cNvGrpSpPr/>
-            <p:nvPr/>
-          </p:nvGrpSpPr>
-          <p:grpSpPr>
-            <a:xfrm>
-              <a:off x="35895265" y="13317819"/>
-              <a:ext cx="7569152" cy="458112"/>
-              <a:chOff x="35843077" y="7228114"/>
-              <a:chExt cx="6315322" cy="458112"/>
-            </a:xfrm>
-          </p:grpSpPr>
-          <p:sp>
-            <p:nvSpPr>
-              <p:cNvPr id="14" name="TextBox 13"/>
-              <p:cNvSpPr txBox="1"/>
-              <p:nvPr/>
-            </p:nvSpPr>
-            <p:spPr>
-              <a:xfrm>
-                <a:off x="35843077" y="7228114"/>
-                <a:ext cx="6315322" cy="458112"/>
-              </a:xfrm>
-              <a:prstGeom prst="rect">
-                <a:avLst/>
-              </a:prstGeom>
-              <a:noFill/>
-              <a:ln>
-                <a:solidFill>
-                  <a:srgbClr val="002755"/>
-                </a:solidFill>
-              </a:ln>
-            </p:spPr>
-            <p:txBody>
-              <a:bodyPr wrap="square" rtlCol="0">
-                <a:spAutoFit/>
-              </a:bodyPr>
-              <a:lstStyle/>
-              <a:p>
-                <a:endParaRPr lang="en-US" sz="1633" dirty="0"/>
-              </a:p>
-            </p:txBody>
-          </p:sp>
-          <p:sp>
-            <p:nvSpPr>
-              <p:cNvPr id="15" name="TextBox 14"/>
-              <p:cNvSpPr txBox="1"/>
-              <p:nvPr/>
-            </p:nvSpPr>
-            <p:spPr>
-              <a:xfrm>
-                <a:off x="35850289" y="7228114"/>
-                <a:ext cx="6308110" cy="458112"/>
-              </a:xfrm>
-              <a:prstGeom prst="rect">
-                <a:avLst/>
-              </a:prstGeom>
-              <a:solidFill>
-                <a:srgbClr val="002755"/>
-              </a:solidFill>
-            </p:spPr>
-            <p:txBody>
-              <a:bodyPr wrap="square" rtlCol="0">
-                <a:spAutoFit/>
-              </a:bodyPr>
-              <a:lstStyle/>
-              <a:p>
-                <a:endParaRPr lang="en-US" sz="1633" dirty="0"/>
-              </a:p>
-            </p:txBody>
-          </p:sp>
-        </p:grpSp>
-        <p:sp>
-          <p:nvSpPr>
-            <p:cNvPr id="12" name="TextBox 11"/>
-            <p:cNvSpPr txBox="1"/>
-            <p:nvPr/>
-          </p:nvSpPr>
-          <p:spPr>
-            <a:xfrm>
-              <a:off x="35837121" y="13419587"/>
-              <a:ext cx="7618648" cy="1046501"/>
-            </a:xfrm>
-            <a:prstGeom prst="rect">
-              <a:avLst/>
-            </a:prstGeom>
-            <a:noFill/>
-          </p:spPr>
-          <p:txBody>
-            <a:bodyPr wrap="square" rtlCol="0">
-              <a:spAutoFit/>
-            </a:bodyPr>
-            <a:lstStyle/>
-            <a:p>
-              <a:pPr algn="ctr"/>
-              <a:r>
-                <a:rPr lang="en-US" sz="4501" dirty="0">
-                  <a:solidFill>
-                    <a:schemeClr val="bg1"/>
-                  </a:solidFill>
-                </a:rPr>
-                <a:t>Research Computing</a:t>
-              </a:r>
-            </a:p>
-          </p:txBody>
-        </p:sp>
-        <p:sp>
-          <p:nvSpPr>
-            <p:cNvPr id="13" name="TextBox 12"/>
-            <p:cNvSpPr txBox="1"/>
-            <p:nvPr/>
-          </p:nvSpPr>
-          <p:spPr>
-            <a:xfrm>
-              <a:off x="36104336" y="15028808"/>
-              <a:ext cx="7210674" cy="1784916"/>
-            </a:xfrm>
-            <a:prstGeom prst="rect">
-              <a:avLst/>
-            </a:prstGeom>
-            <a:noFill/>
-          </p:spPr>
-          <p:txBody>
-            <a:bodyPr wrap="square" rtlCol="0">
-              <a:spAutoFit/>
-            </a:bodyPr>
-            <a:lstStyle/>
-            <a:p>
-              <a:pPr algn="ctr"/>
-              <a:r>
-                <a:rPr lang="en-US" sz="2700" dirty="0"/>
-                <a:t>Helping build </a:t>
-              </a:r>
-              <a:r>
-                <a:rPr lang="en-US" sz="2700" b="1" dirty="0">
-                  <a:hlinkClick r:id="rId3"/>
-                </a:rPr>
-                <a:t>high-performance software and hardware</a:t>
-              </a:r>
-              <a:r>
-                <a:rPr lang="en-US" sz="2700" b="1" dirty="0"/>
-                <a:t> </a:t>
-              </a:r>
-              <a:r>
-                <a:rPr lang="en-US" sz="2700" dirty="0"/>
-                <a:t>bioinformatics solutions</a:t>
-              </a:r>
-            </a:p>
-          </p:txBody>
-        </p:sp>
-      </p:grpSp>
-      <p:grpSp>
-        <p:nvGrpSpPr>
-          <p:cNvPr id="16" name="Group 15"/>
-          <p:cNvGrpSpPr/>
-          <p:nvPr/>
-        </p:nvGrpSpPr>
-        <p:grpSpPr>
-          <a:xfrm>
-            <a:off x="29227214" y="22213136"/>
-            <a:ext cx="5735254" cy="2678500"/>
-            <a:chOff x="36049537" y="18707397"/>
-            <a:chExt cx="7646202" cy="3570958"/>
-          </a:xfrm>
-        </p:grpSpPr>
-        <p:grpSp>
-          <p:nvGrpSpPr>
-            <p:cNvPr id="17" name="Group 16"/>
-            <p:cNvGrpSpPr/>
-            <p:nvPr/>
-          </p:nvGrpSpPr>
-          <p:grpSpPr>
-            <a:xfrm>
-              <a:off x="36049537" y="18707397"/>
-              <a:ext cx="7631216" cy="458112"/>
-              <a:chOff x="35791294" y="7228114"/>
-              <a:chExt cx="6367105" cy="458112"/>
-            </a:xfrm>
-          </p:grpSpPr>
-          <p:sp>
-            <p:nvSpPr>
-              <p:cNvPr id="20" name="TextBox 19"/>
-              <p:cNvSpPr txBox="1"/>
-              <p:nvPr/>
-            </p:nvSpPr>
-            <p:spPr>
-              <a:xfrm>
-                <a:off x="35843077" y="7228114"/>
-                <a:ext cx="6315322" cy="458112"/>
-              </a:xfrm>
-              <a:prstGeom prst="rect">
-                <a:avLst/>
-              </a:prstGeom>
-              <a:noFill/>
-              <a:ln>
-                <a:solidFill>
-                  <a:srgbClr val="002755"/>
-                </a:solidFill>
-              </a:ln>
-            </p:spPr>
-            <p:txBody>
-              <a:bodyPr wrap="square" rtlCol="0">
-                <a:spAutoFit/>
-              </a:bodyPr>
-              <a:lstStyle/>
-              <a:p>
-                <a:endParaRPr lang="en-US" sz="1633" dirty="0"/>
-              </a:p>
-            </p:txBody>
-          </p:sp>
-          <p:sp>
-            <p:nvSpPr>
-              <p:cNvPr id="21" name="TextBox 20"/>
-              <p:cNvSpPr txBox="1"/>
-              <p:nvPr/>
-            </p:nvSpPr>
-            <p:spPr>
-              <a:xfrm>
-                <a:off x="35791294" y="7228114"/>
-                <a:ext cx="6358194" cy="458112"/>
-              </a:xfrm>
-              <a:prstGeom prst="rect">
-                <a:avLst/>
-              </a:prstGeom>
-              <a:solidFill>
-                <a:srgbClr val="002755"/>
-              </a:solidFill>
-            </p:spPr>
-            <p:txBody>
-              <a:bodyPr wrap="square" rtlCol="0">
-                <a:spAutoFit/>
-              </a:bodyPr>
-              <a:lstStyle/>
-              <a:p>
-                <a:endParaRPr lang="en-US" sz="1633" dirty="0"/>
-              </a:p>
-            </p:txBody>
-          </p:sp>
-        </p:grpSp>
-        <p:sp>
-          <p:nvSpPr>
-            <p:cNvPr id="18" name="TextBox 17"/>
-            <p:cNvSpPr txBox="1"/>
-            <p:nvPr/>
-          </p:nvSpPr>
-          <p:spPr>
-            <a:xfrm>
-              <a:off x="36137266" y="18809165"/>
-              <a:ext cx="7558473" cy="1046501"/>
-            </a:xfrm>
-            <a:prstGeom prst="rect">
-              <a:avLst/>
-            </a:prstGeom>
-            <a:noFill/>
-          </p:spPr>
-          <p:txBody>
-            <a:bodyPr wrap="square" rtlCol="0">
-              <a:spAutoFit/>
-            </a:bodyPr>
-            <a:lstStyle/>
-            <a:p>
-              <a:pPr algn="ctr"/>
-              <a:r>
-                <a:rPr lang="en-US" sz="4501" dirty="0">
-                  <a:solidFill>
-                    <a:schemeClr val="bg1"/>
-                  </a:solidFill>
-                </a:rPr>
-                <a:t>Training</a:t>
-              </a:r>
-            </a:p>
-          </p:txBody>
-        </p:sp>
-        <p:sp>
-          <p:nvSpPr>
-            <p:cNvPr id="19" name="TextBox 18"/>
-            <p:cNvSpPr txBox="1"/>
-            <p:nvPr/>
-          </p:nvSpPr>
-          <p:spPr>
-            <a:xfrm>
-              <a:off x="36169648" y="20493439"/>
-              <a:ext cx="7413338" cy="1784916"/>
-            </a:xfrm>
-            <a:prstGeom prst="rect">
-              <a:avLst/>
-            </a:prstGeom>
-            <a:noFill/>
-          </p:spPr>
-          <p:txBody>
-            <a:bodyPr wrap="square" rtlCol="0">
-              <a:spAutoFit/>
-            </a:bodyPr>
-            <a:lstStyle/>
-            <a:p>
-              <a:pPr algn="ctr"/>
-              <a:r>
-                <a:rPr lang="en-US" sz="2700" dirty="0"/>
-                <a:t>Providing </a:t>
-              </a:r>
-              <a:r>
-                <a:rPr lang="en-US" sz="2700" b="1" dirty="0">
-                  <a:hlinkClick r:id="rId4"/>
-                </a:rPr>
-                <a:t>acclaimed training workshops</a:t>
-              </a:r>
-              <a:r>
-                <a:rPr lang="en-US" sz="2700" dirty="0"/>
-                <a:t> that will equip people with in-demand bioinformatics skills</a:t>
-              </a:r>
-            </a:p>
-          </p:txBody>
-        </p:sp>
-      </p:grpSp>
-      <p:grpSp>
-        <p:nvGrpSpPr>
-          <p:cNvPr id="22" name="Group 21"/>
-          <p:cNvGrpSpPr/>
-          <p:nvPr/>
-        </p:nvGrpSpPr>
-        <p:grpSpPr>
-          <a:xfrm>
-            <a:off x="15356649" y="22327446"/>
-            <a:ext cx="5701076" cy="2639303"/>
-            <a:chOff x="35811593" y="7228114"/>
-            <a:chExt cx="7600636" cy="3518702"/>
-          </a:xfrm>
-        </p:grpSpPr>
-        <p:grpSp>
-          <p:nvGrpSpPr>
-            <p:cNvPr id="23" name="Group 22"/>
-            <p:cNvGrpSpPr/>
-            <p:nvPr/>
-          </p:nvGrpSpPr>
-          <p:grpSpPr>
-            <a:xfrm>
-              <a:off x="35843077" y="7228114"/>
-              <a:ext cx="7569152" cy="458112"/>
-              <a:chOff x="35843077" y="7228114"/>
-              <a:chExt cx="6315322" cy="458112"/>
-            </a:xfrm>
-          </p:grpSpPr>
-          <p:sp>
-            <p:nvSpPr>
-              <p:cNvPr id="26" name="TextBox 25"/>
-              <p:cNvSpPr txBox="1"/>
-              <p:nvPr/>
-            </p:nvSpPr>
-            <p:spPr>
-              <a:xfrm>
-                <a:off x="35843077" y="7228114"/>
-                <a:ext cx="6315322" cy="458112"/>
-              </a:xfrm>
-              <a:prstGeom prst="rect">
-                <a:avLst/>
-              </a:prstGeom>
-              <a:noFill/>
-              <a:ln>
-                <a:solidFill>
-                  <a:srgbClr val="002755"/>
-                </a:solidFill>
-              </a:ln>
-            </p:spPr>
-            <p:txBody>
-              <a:bodyPr wrap="square" rtlCol="0">
-                <a:spAutoFit/>
-              </a:bodyPr>
-              <a:lstStyle/>
-              <a:p>
-                <a:endParaRPr lang="en-US" sz="1633" dirty="0"/>
-              </a:p>
-            </p:txBody>
-          </p:sp>
-          <p:sp>
-            <p:nvSpPr>
-              <p:cNvPr id="27" name="TextBox 26"/>
-              <p:cNvSpPr txBox="1"/>
-              <p:nvPr/>
-            </p:nvSpPr>
-            <p:spPr>
-              <a:xfrm>
-                <a:off x="35886620" y="7228114"/>
-                <a:ext cx="6262868" cy="458112"/>
-              </a:xfrm>
-              <a:prstGeom prst="rect">
-                <a:avLst/>
-              </a:prstGeom>
-              <a:solidFill>
-                <a:srgbClr val="002755"/>
-              </a:solidFill>
-            </p:spPr>
-            <p:txBody>
-              <a:bodyPr wrap="square" rtlCol="0">
-                <a:spAutoFit/>
-              </a:bodyPr>
-              <a:lstStyle/>
-              <a:p>
-                <a:endParaRPr lang="en-US" sz="1633" dirty="0"/>
-              </a:p>
-            </p:txBody>
-          </p:sp>
-        </p:grpSp>
-        <p:sp>
-          <p:nvSpPr>
-            <p:cNvPr id="24" name="TextBox 23"/>
-            <p:cNvSpPr txBox="1"/>
-            <p:nvPr/>
-          </p:nvSpPr>
-          <p:spPr>
-            <a:xfrm>
-              <a:off x="35811593" y="7375757"/>
-              <a:ext cx="7589957" cy="1046501"/>
-            </a:xfrm>
-            <a:prstGeom prst="rect">
-              <a:avLst/>
-            </a:prstGeom>
-            <a:noFill/>
-          </p:spPr>
-          <p:txBody>
-            <a:bodyPr wrap="square" rtlCol="0">
-              <a:spAutoFit/>
-            </a:bodyPr>
-            <a:lstStyle/>
-            <a:p>
-              <a:pPr algn="ctr"/>
-              <a:r>
-                <a:rPr lang="en-US" sz="4501" dirty="0">
-                  <a:solidFill>
-                    <a:schemeClr val="bg1"/>
-                  </a:solidFill>
-                </a:rPr>
-                <a:t>Data Analysis</a:t>
-              </a:r>
-            </a:p>
-          </p:txBody>
-        </p:sp>
-        <p:sp>
-          <p:nvSpPr>
-            <p:cNvPr id="25" name="TextBox 24"/>
-            <p:cNvSpPr txBox="1"/>
-            <p:nvPr/>
-          </p:nvSpPr>
-          <p:spPr>
-            <a:xfrm>
-              <a:off x="36060246" y="8961899"/>
-              <a:ext cx="7210673" cy="1784917"/>
-            </a:xfrm>
-            <a:prstGeom prst="rect">
-              <a:avLst/>
-            </a:prstGeom>
-            <a:noFill/>
-          </p:spPr>
-          <p:txBody>
-            <a:bodyPr wrap="square" rtlCol="0">
-              <a:spAutoFit/>
-            </a:bodyPr>
-            <a:lstStyle/>
-            <a:p>
-              <a:pPr algn="ctr"/>
-              <a:r>
-                <a:rPr lang="en-US" sz="2700" b="1" dirty="0">
-                  <a:hlinkClick r:id="rId2"/>
-                </a:rPr>
-                <a:t>Intelligently analyzing data</a:t>
-              </a:r>
-              <a:r>
-                <a:rPr lang="en-US" sz="2700" dirty="0"/>
-                <a:t> from genomics, and other projects, to help drive research forward</a:t>
-              </a:r>
-            </a:p>
-          </p:txBody>
-        </p:sp>
-      </p:grpSp>
-      <p:grpSp>
-        <p:nvGrpSpPr>
-          <p:cNvPr id="28" name="Group 27"/>
-          <p:cNvGrpSpPr/>
-          <p:nvPr/>
-        </p:nvGrpSpPr>
-        <p:grpSpPr>
-          <a:xfrm>
-            <a:off x="22367606" y="22327446"/>
-            <a:ext cx="5721073" cy="2622204"/>
-            <a:chOff x="35837121" y="13317819"/>
-            <a:chExt cx="7627296" cy="3495905"/>
-          </a:xfrm>
-        </p:grpSpPr>
-        <p:grpSp>
-          <p:nvGrpSpPr>
-            <p:cNvPr id="29" name="Group 28"/>
-            <p:cNvGrpSpPr/>
-            <p:nvPr/>
-          </p:nvGrpSpPr>
-          <p:grpSpPr>
-            <a:xfrm>
-              <a:off x="35895265" y="13317819"/>
-              <a:ext cx="7569152" cy="458112"/>
-              <a:chOff x="35843077" y="7228114"/>
-              <a:chExt cx="6315322" cy="458112"/>
-            </a:xfrm>
-          </p:grpSpPr>
-          <p:sp>
-            <p:nvSpPr>
-              <p:cNvPr id="32" name="TextBox 31"/>
-              <p:cNvSpPr txBox="1"/>
-              <p:nvPr/>
-            </p:nvSpPr>
-            <p:spPr>
-              <a:xfrm>
-                <a:off x="35843077" y="7228114"/>
-                <a:ext cx="6315322" cy="458112"/>
-              </a:xfrm>
-              <a:prstGeom prst="rect">
-                <a:avLst/>
-              </a:prstGeom>
-              <a:noFill/>
-              <a:ln>
-                <a:solidFill>
-                  <a:srgbClr val="002755"/>
-                </a:solidFill>
-              </a:ln>
-            </p:spPr>
-            <p:txBody>
-              <a:bodyPr wrap="square" rtlCol="0">
-                <a:spAutoFit/>
-              </a:bodyPr>
-              <a:lstStyle/>
-              <a:p>
-                <a:endParaRPr lang="en-US" sz="1633" dirty="0"/>
-              </a:p>
-            </p:txBody>
-          </p:sp>
-          <p:sp>
-            <p:nvSpPr>
-              <p:cNvPr id="33" name="TextBox 32"/>
-              <p:cNvSpPr txBox="1"/>
-              <p:nvPr/>
-            </p:nvSpPr>
-            <p:spPr>
-              <a:xfrm>
-                <a:off x="35850289" y="7228114"/>
-                <a:ext cx="6308110" cy="458112"/>
-              </a:xfrm>
-              <a:prstGeom prst="rect">
-                <a:avLst/>
-              </a:prstGeom>
-              <a:solidFill>
-                <a:srgbClr val="002755"/>
-              </a:solidFill>
-            </p:spPr>
-            <p:txBody>
-              <a:bodyPr wrap="square" rtlCol="0">
-                <a:spAutoFit/>
-              </a:bodyPr>
-              <a:lstStyle/>
-              <a:p>
-                <a:endParaRPr lang="en-US" sz="1633" dirty="0"/>
-              </a:p>
-            </p:txBody>
-          </p:sp>
-        </p:grpSp>
-        <p:sp>
-          <p:nvSpPr>
-            <p:cNvPr id="30" name="TextBox 29"/>
-            <p:cNvSpPr txBox="1"/>
-            <p:nvPr/>
-          </p:nvSpPr>
-          <p:spPr>
-            <a:xfrm>
-              <a:off x="35837121" y="13419587"/>
-              <a:ext cx="7618648" cy="1046501"/>
-            </a:xfrm>
-            <a:prstGeom prst="rect">
-              <a:avLst/>
-            </a:prstGeom>
-            <a:noFill/>
-          </p:spPr>
-          <p:txBody>
-            <a:bodyPr wrap="square" rtlCol="0">
-              <a:spAutoFit/>
-            </a:bodyPr>
-            <a:lstStyle/>
-            <a:p>
-              <a:pPr algn="ctr"/>
-              <a:r>
-                <a:rPr lang="en-US" sz="4501" dirty="0">
-                  <a:solidFill>
-                    <a:schemeClr val="bg1"/>
-                  </a:solidFill>
-                </a:rPr>
-                <a:t>Research Computing</a:t>
-              </a:r>
-            </a:p>
-          </p:txBody>
-        </p:sp>
-        <p:sp>
-          <p:nvSpPr>
-            <p:cNvPr id="31" name="TextBox 30"/>
-            <p:cNvSpPr txBox="1"/>
-            <p:nvPr/>
-          </p:nvSpPr>
-          <p:spPr>
-            <a:xfrm>
-              <a:off x="36104336" y="15028808"/>
-              <a:ext cx="7210674" cy="1784916"/>
-            </a:xfrm>
-            <a:prstGeom prst="rect">
-              <a:avLst/>
-            </a:prstGeom>
-            <a:noFill/>
-          </p:spPr>
-          <p:txBody>
-            <a:bodyPr wrap="square" rtlCol="0">
-              <a:spAutoFit/>
-            </a:bodyPr>
-            <a:lstStyle/>
-            <a:p>
-              <a:pPr algn="ctr"/>
-              <a:r>
-                <a:rPr lang="en-US" sz="2700" dirty="0"/>
-                <a:t>Helping build </a:t>
-              </a:r>
-              <a:r>
-                <a:rPr lang="en-US" sz="2700" b="1" dirty="0">
-                  <a:hlinkClick r:id="rId3"/>
-                </a:rPr>
-                <a:t>high-performance software and hardware</a:t>
-              </a:r>
-              <a:r>
-                <a:rPr lang="en-US" sz="2700" b="1" dirty="0"/>
-                <a:t> </a:t>
-              </a:r>
-              <a:r>
-                <a:rPr lang="en-US" sz="2700" dirty="0"/>
-                <a:t>bioinformatics solutions</a:t>
-              </a:r>
-            </a:p>
-          </p:txBody>
-        </p:sp>
-      </p:grpSp>
-      <p:grpSp>
-        <p:nvGrpSpPr>
-          <p:cNvPr id="34" name="Group 33"/>
-          <p:cNvGrpSpPr/>
-          <p:nvPr/>
-        </p:nvGrpSpPr>
-        <p:grpSpPr>
-          <a:xfrm>
-            <a:off x="29341526" y="22327448"/>
-            <a:ext cx="5735254" cy="2678500"/>
-            <a:chOff x="36049537" y="18707397"/>
-            <a:chExt cx="7646202" cy="3570958"/>
-          </a:xfrm>
-        </p:grpSpPr>
-        <p:grpSp>
-          <p:nvGrpSpPr>
-            <p:cNvPr id="35" name="Group 34"/>
-            <p:cNvGrpSpPr/>
-            <p:nvPr/>
-          </p:nvGrpSpPr>
-          <p:grpSpPr>
-            <a:xfrm>
-              <a:off x="36049537" y="18707397"/>
-              <a:ext cx="7631216" cy="458112"/>
-              <a:chOff x="35791294" y="7228114"/>
-              <a:chExt cx="6367105" cy="458112"/>
-            </a:xfrm>
-          </p:grpSpPr>
-          <p:sp>
-            <p:nvSpPr>
-              <p:cNvPr id="38" name="TextBox 37"/>
-              <p:cNvSpPr txBox="1"/>
-              <p:nvPr/>
-            </p:nvSpPr>
-            <p:spPr>
-              <a:xfrm>
-                <a:off x="35843077" y="7228114"/>
-                <a:ext cx="6315322" cy="458112"/>
-              </a:xfrm>
-              <a:prstGeom prst="rect">
-                <a:avLst/>
-              </a:prstGeom>
-              <a:noFill/>
-              <a:ln>
-                <a:solidFill>
-                  <a:srgbClr val="002755"/>
-                </a:solidFill>
-              </a:ln>
-            </p:spPr>
-            <p:txBody>
-              <a:bodyPr wrap="square" rtlCol="0">
-                <a:spAutoFit/>
-              </a:bodyPr>
-              <a:lstStyle/>
-              <a:p>
-                <a:endParaRPr lang="en-US" sz="1633" dirty="0"/>
-              </a:p>
-            </p:txBody>
-          </p:sp>
-          <p:sp>
-            <p:nvSpPr>
-              <p:cNvPr id="39" name="TextBox 38"/>
-              <p:cNvSpPr txBox="1"/>
-              <p:nvPr/>
-            </p:nvSpPr>
-            <p:spPr>
-              <a:xfrm>
-                <a:off x="35791294" y="7228114"/>
-                <a:ext cx="6358194" cy="458112"/>
-              </a:xfrm>
-              <a:prstGeom prst="rect">
-                <a:avLst/>
-              </a:prstGeom>
-              <a:solidFill>
-                <a:srgbClr val="002755"/>
-              </a:solidFill>
-            </p:spPr>
-            <p:txBody>
-              <a:bodyPr wrap="square" rtlCol="0">
-                <a:spAutoFit/>
-              </a:bodyPr>
-              <a:lstStyle/>
-              <a:p>
-                <a:endParaRPr lang="en-US" sz="1633" dirty="0"/>
-              </a:p>
-            </p:txBody>
-          </p:sp>
-        </p:grpSp>
-        <p:sp>
-          <p:nvSpPr>
-            <p:cNvPr id="36" name="TextBox 35"/>
-            <p:cNvSpPr txBox="1"/>
-            <p:nvPr/>
-          </p:nvSpPr>
-          <p:spPr>
-            <a:xfrm>
-              <a:off x="36137266" y="18809165"/>
-              <a:ext cx="7558473" cy="1046501"/>
-            </a:xfrm>
-            <a:prstGeom prst="rect">
-              <a:avLst/>
-            </a:prstGeom>
-            <a:noFill/>
-          </p:spPr>
-          <p:txBody>
-            <a:bodyPr wrap="square" rtlCol="0">
-              <a:spAutoFit/>
-            </a:bodyPr>
-            <a:lstStyle/>
-            <a:p>
-              <a:pPr algn="ctr"/>
-              <a:r>
-                <a:rPr lang="en-US" sz="4501" dirty="0">
-                  <a:solidFill>
-                    <a:schemeClr val="bg1"/>
-                  </a:solidFill>
-                </a:rPr>
-                <a:t>Training</a:t>
-              </a:r>
-            </a:p>
-          </p:txBody>
-        </p:sp>
-        <p:sp>
-          <p:nvSpPr>
-            <p:cNvPr id="37" name="TextBox 36"/>
-            <p:cNvSpPr txBox="1"/>
-            <p:nvPr/>
-          </p:nvSpPr>
-          <p:spPr>
-            <a:xfrm>
-              <a:off x="36169648" y="20493439"/>
-              <a:ext cx="7413338" cy="1784916"/>
-            </a:xfrm>
-            <a:prstGeom prst="rect">
-              <a:avLst/>
-            </a:prstGeom>
-            <a:noFill/>
-          </p:spPr>
-          <p:txBody>
-            <a:bodyPr wrap="square" rtlCol="0">
-              <a:spAutoFit/>
-            </a:bodyPr>
-            <a:lstStyle/>
-            <a:p>
-              <a:pPr algn="ctr"/>
-              <a:r>
-                <a:rPr lang="en-US" sz="2700" dirty="0"/>
-                <a:t>Providing </a:t>
-              </a:r>
-              <a:r>
-                <a:rPr lang="en-US" sz="2700" b="1" dirty="0">
-                  <a:hlinkClick r:id="rId4"/>
-                </a:rPr>
-                <a:t>acclaimed training workshops</a:t>
-              </a:r>
-              <a:r>
-                <a:rPr lang="en-US" sz="2700" dirty="0"/>
-                <a:t> that will equip people with in-demand bioinformatics skills</a:t>
-              </a:r>
-            </a:p>
-          </p:txBody>
-        </p:sp>
-      </p:grpSp>
-      <p:grpSp>
-        <p:nvGrpSpPr>
-          <p:cNvPr id="40" name="Group 39"/>
-          <p:cNvGrpSpPr/>
-          <p:nvPr/>
-        </p:nvGrpSpPr>
-        <p:grpSpPr>
-          <a:xfrm>
-            <a:off x="15470960" y="22441759"/>
-            <a:ext cx="5701076" cy="2639303"/>
-            <a:chOff x="35811593" y="7228114"/>
-            <a:chExt cx="7600636" cy="3518702"/>
-          </a:xfrm>
-        </p:grpSpPr>
-        <p:grpSp>
-          <p:nvGrpSpPr>
-            <p:cNvPr id="41" name="Group 40"/>
-            <p:cNvGrpSpPr/>
-            <p:nvPr/>
-          </p:nvGrpSpPr>
-          <p:grpSpPr>
-            <a:xfrm>
-              <a:off x="35843077" y="7228114"/>
-              <a:ext cx="7569152" cy="458112"/>
-              <a:chOff x="35843077" y="7228114"/>
-              <a:chExt cx="6315322" cy="458112"/>
-            </a:xfrm>
-          </p:grpSpPr>
-          <p:sp>
-            <p:nvSpPr>
-              <p:cNvPr id="44" name="TextBox 43"/>
-              <p:cNvSpPr txBox="1"/>
-              <p:nvPr/>
-            </p:nvSpPr>
-            <p:spPr>
-              <a:xfrm>
-                <a:off x="35843077" y="7228114"/>
-                <a:ext cx="6315322" cy="458112"/>
-              </a:xfrm>
-              <a:prstGeom prst="rect">
-                <a:avLst/>
-              </a:prstGeom>
-              <a:noFill/>
-              <a:ln>
-                <a:solidFill>
-                  <a:srgbClr val="002755"/>
-                </a:solidFill>
-              </a:ln>
-            </p:spPr>
-            <p:txBody>
-              <a:bodyPr wrap="square" rtlCol="0">
-                <a:spAutoFit/>
-              </a:bodyPr>
-              <a:lstStyle/>
-              <a:p>
-                <a:endParaRPr lang="en-US" sz="1633" dirty="0"/>
-              </a:p>
-            </p:txBody>
-          </p:sp>
-          <p:sp>
-            <p:nvSpPr>
-              <p:cNvPr id="45" name="TextBox 44"/>
-              <p:cNvSpPr txBox="1"/>
-              <p:nvPr/>
-            </p:nvSpPr>
-            <p:spPr>
-              <a:xfrm>
-                <a:off x="35886620" y="7228114"/>
-                <a:ext cx="6262868" cy="458112"/>
-              </a:xfrm>
-              <a:prstGeom prst="rect">
-                <a:avLst/>
-              </a:prstGeom>
-              <a:solidFill>
-                <a:srgbClr val="002755"/>
-              </a:solidFill>
-            </p:spPr>
-            <p:txBody>
-              <a:bodyPr wrap="square" rtlCol="0">
-                <a:spAutoFit/>
-              </a:bodyPr>
-              <a:lstStyle/>
-              <a:p>
-                <a:endParaRPr lang="en-US" sz="1633" dirty="0"/>
-              </a:p>
-            </p:txBody>
-          </p:sp>
-        </p:grpSp>
-        <p:sp>
-          <p:nvSpPr>
-            <p:cNvPr id="42" name="TextBox 41"/>
-            <p:cNvSpPr txBox="1"/>
-            <p:nvPr/>
-          </p:nvSpPr>
-          <p:spPr>
-            <a:xfrm>
-              <a:off x="35811593" y="7375757"/>
-              <a:ext cx="7589957" cy="1046501"/>
-            </a:xfrm>
-            <a:prstGeom prst="rect">
-              <a:avLst/>
-            </a:prstGeom>
-            <a:noFill/>
-          </p:spPr>
-          <p:txBody>
-            <a:bodyPr wrap="square" rtlCol="0">
-              <a:spAutoFit/>
-            </a:bodyPr>
-            <a:lstStyle/>
-            <a:p>
-              <a:pPr algn="ctr"/>
-              <a:r>
-                <a:rPr lang="en-US" sz="4501" dirty="0">
-                  <a:solidFill>
-                    <a:schemeClr val="bg1"/>
-                  </a:solidFill>
-                </a:rPr>
-                <a:t>Data Analysis</a:t>
-              </a:r>
-            </a:p>
-          </p:txBody>
-        </p:sp>
-        <p:sp>
-          <p:nvSpPr>
-            <p:cNvPr id="43" name="TextBox 42"/>
-            <p:cNvSpPr txBox="1"/>
-            <p:nvPr/>
-          </p:nvSpPr>
-          <p:spPr>
-            <a:xfrm>
-              <a:off x="36060246" y="8961899"/>
-              <a:ext cx="7210673" cy="1784917"/>
-            </a:xfrm>
-            <a:prstGeom prst="rect">
-              <a:avLst/>
-            </a:prstGeom>
-            <a:noFill/>
-          </p:spPr>
-          <p:txBody>
-            <a:bodyPr wrap="square" rtlCol="0">
-              <a:spAutoFit/>
-            </a:bodyPr>
-            <a:lstStyle/>
-            <a:p>
-              <a:pPr algn="ctr"/>
-              <a:r>
-                <a:rPr lang="en-US" sz="2700" b="1" dirty="0">
-                  <a:hlinkClick r:id="rId2"/>
-                </a:rPr>
-                <a:t>Intelligently analyzing data</a:t>
-              </a:r>
-              <a:r>
-                <a:rPr lang="en-US" sz="2700" dirty="0"/>
-                <a:t> from genomics, and other projects, to help drive research forward</a:t>
-              </a:r>
-            </a:p>
-          </p:txBody>
-        </p:sp>
-      </p:grpSp>
-      <p:grpSp>
-        <p:nvGrpSpPr>
-          <p:cNvPr id="46" name="Group 45"/>
-          <p:cNvGrpSpPr/>
-          <p:nvPr/>
-        </p:nvGrpSpPr>
-        <p:grpSpPr>
-          <a:xfrm>
-            <a:off x="22481918" y="22441758"/>
-            <a:ext cx="5721073" cy="2622204"/>
-            <a:chOff x="35837121" y="13317819"/>
-            <a:chExt cx="7627296" cy="3495905"/>
-          </a:xfrm>
-        </p:grpSpPr>
-        <p:grpSp>
-          <p:nvGrpSpPr>
-            <p:cNvPr id="47" name="Group 46"/>
-            <p:cNvGrpSpPr/>
-            <p:nvPr/>
-          </p:nvGrpSpPr>
-          <p:grpSpPr>
-            <a:xfrm>
-              <a:off x="35895265" y="13317819"/>
-              <a:ext cx="7569152" cy="458112"/>
-              <a:chOff x="35843077" y="7228114"/>
-              <a:chExt cx="6315322" cy="458112"/>
-            </a:xfrm>
-          </p:grpSpPr>
-          <p:sp>
-            <p:nvSpPr>
-              <p:cNvPr id="50" name="TextBox 49"/>
-              <p:cNvSpPr txBox="1"/>
-              <p:nvPr/>
-            </p:nvSpPr>
-            <p:spPr>
-              <a:xfrm>
-                <a:off x="35843077" y="7228114"/>
-                <a:ext cx="6315322" cy="458112"/>
-              </a:xfrm>
-              <a:prstGeom prst="rect">
-                <a:avLst/>
-              </a:prstGeom>
-              <a:noFill/>
-              <a:ln>
-                <a:solidFill>
-                  <a:srgbClr val="002755"/>
-                </a:solidFill>
-              </a:ln>
-            </p:spPr>
-            <p:txBody>
-              <a:bodyPr wrap="square" rtlCol="0">
-                <a:spAutoFit/>
-              </a:bodyPr>
-              <a:lstStyle/>
-              <a:p>
-                <a:endParaRPr lang="en-US" sz="1633" dirty="0"/>
-              </a:p>
-            </p:txBody>
-          </p:sp>
-          <p:sp>
-            <p:nvSpPr>
-              <p:cNvPr id="51" name="TextBox 50"/>
-              <p:cNvSpPr txBox="1"/>
-              <p:nvPr/>
-            </p:nvSpPr>
-            <p:spPr>
-              <a:xfrm>
-                <a:off x="35850289" y="7228114"/>
-                <a:ext cx="6308110" cy="458112"/>
-              </a:xfrm>
-              <a:prstGeom prst="rect">
-                <a:avLst/>
-              </a:prstGeom>
-              <a:solidFill>
-                <a:srgbClr val="002755"/>
-              </a:solidFill>
-            </p:spPr>
-            <p:txBody>
-              <a:bodyPr wrap="square" rtlCol="0">
-                <a:spAutoFit/>
-              </a:bodyPr>
-              <a:lstStyle/>
-              <a:p>
-                <a:endParaRPr lang="en-US" sz="1633" dirty="0"/>
-              </a:p>
-            </p:txBody>
-          </p:sp>
-        </p:grpSp>
-        <p:sp>
-          <p:nvSpPr>
-            <p:cNvPr id="48" name="TextBox 47"/>
-            <p:cNvSpPr txBox="1"/>
-            <p:nvPr/>
-          </p:nvSpPr>
-          <p:spPr>
-            <a:xfrm>
-              <a:off x="35837121" y="13419587"/>
-              <a:ext cx="7618648" cy="1046501"/>
-            </a:xfrm>
-            <a:prstGeom prst="rect">
-              <a:avLst/>
-            </a:prstGeom>
-            <a:noFill/>
-          </p:spPr>
-          <p:txBody>
-            <a:bodyPr wrap="square" rtlCol="0">
-              <a:spAutoFit/>
-            </a:bodyPr>
-            <a:lstStyle/>
-            <a:p>
-              <a:pPr algn="ctr"/>
-              <a:r>
-                <a:rPr lang="en-US" sz="4501" dirty="0">
-                  <a:solidFill>
-                    <a:schemeClr val="bg1"/>
-                  </a:solidFill>
-                </a:rPr>
-                <a:t>Research Computing</a:t>
-              </a:r>
-            </a:p>
-          </p:txBody>
-        </p:sp>
-        <p:sp>
-          <p:nvSpPr>
-            <p:cNvPr id="49" name="TextBox 48"/>
-            <p:cNvSpPr txBox="1"/>
-            <p:nvPr/>
-          </p:nvSpPr>
-          <p:spPr>
-            <a:xfrm>
-              <a:off x="36104336" y="15028808"/>
-              <a:ext cx="7210674" cy="1784916"/>
-            </a:xfrm>
-            <a:prstGeom prst="rect">
-              <a:avLst/>
-            </a:prstGeom>
-            <a:noFill/>
-          </p:spPr>
-          <p:txBody>
-            <a:bodyPr wrap="square" rtlCol="0">
-              <a:spAutoFit/>
-            </a:bodyPr>
-            <a:lstStyle/>
-            <a:p>
-              <a:pPr algn="ctr"/>
-              <a:r>
-                <a:rPr lang="en-US" sz="2700" dirty="0"/>
-                <a:t>Helping build </a:t>
-              </a:r>
-              <a:r>
-                <a:rPr lang="en-US" sz="2700" b="1" dirty="0">
-                  <a:hlinkClick r:id="rId3"/>
-                </a:rPr>
-                <a:t>high-performance software and hardware</a:t>
-              </a:r>
-              <a:r>
-                <a:rPr lang="en-US" sz="2700" b="1" dirty="0"/>
-                <a:t> </a:t>
-              </a:r>
-              <a:r>
-                <a:rPr lang="en-US" sz="2700" dirty="0"/>
-                <a:t>bioinformatics solutions</a:t>
-              </a:r>
-            </a:p>
-          </p:txBody>
-        </p:sp>
-      </p:grpSp>
-      <p:grpSp>
-        <p:nvGrpSpPr>
-          <p:cNvPr id="52" name="Group 51"/>
-          <p:cNvGrpSpPr/>
-          <p:nvPr/>
-        </p:nvGrpSpPr>
-        <p:grpSpPr>
-          <a:xfrm>
-            <a:off x="29455838" y="22441760"/>
-            <a:ext cx="5735254" cy="2678500"/>
-            <a:chOff x="36049537" y="18707397"/>
-            <a:chExt cx="7646202" cy="3570958"/>
-          </a:xfrm>
-        </p:grpSpPr>
-        <p:grpSp>
-          <p:nvGrpSpPr>
-            <p:cNvPr id="53" name="Group 52"/>
-            <p:cNvGrpSpPr/>
-            <p:nvPr/>
-          </p:nvGrpSpPr>
-          <p:grpSpPr>
-            <a:xfrm>
-              <a:off x="36049537" y="18707397"/>
-              <a:ext cx="7631216" cy="458112"/>
-              <a:chOff x="35791294" y="7228114"/>
-              <a:chExt cx="6367105" cy="458112"/>
-            </a:xfrm>
-          </p:grpSpPr>
-          <p:sp>
-            <p:nvSpPr>
-              <p:cNvPr id="56" name="TextBox 55"/>
-              <p:cNvSpPr txBox="1"/>
-              <p:nvPr/>
-            </p:nvSpPr>
-            <p:spPr>
-              <a:xfrm>
-                <a:off x="35843077" y="7228114"/>
-                <a:ext cx="6315322" cy="458112"/>
-              </a:xfrm>
-              <a:prstGeom prst="rect">
-                <a:avLst/>
-              </a:prstGeom>
-              <a:noFill/>
-              <a:ln>
-                <a:solidFill>
-                  <a:srgbClr val="002755"/>
-                </a:solidFill>
-              </a:ln>
-            </p:spPr>
-            <p:txBody>
-              <a:bodyPr wrap="square" rtlCol="0">
-                <a:spAutoFit/>
-              </a:bodyPr>
-              <a:lstStyle/>
-              <a:p>
-                <a:endParaRPr lang="en-US" sz="1633" dirty="0"/>
-              </a:p>
-            </p:txBody>
-          </p:sp>
-          <p:sp>
-            <p:nvSpPr>
-              <p:cNvPr id="57" name="TextBox 56"/>
-              <p:cNvSpPr txBox="1"/>
-              <p:nvPr/>
-            </p:nvSpPr>
-            <p:spPr>
-              <a:xfrm>
-                <a:off x="35791294" y="7228114"/>
-                <a:ext cx="6358194" cy="458112"/>
-              </a:xfrm>
-              <a:prstGeom prst="rect">
-                <a:avLst/>
-              </a:prstGeom>
-              <a:solidFill>
-                <a:srgbClr val="002755"/>
-              </a:solidFill>
-            </p:spPr>
-            <p:txBody>
-              <a:bodyPr wrap="square" rtlCol="0">
-                <a:spAutoFit/>
-              </a:bodyPr>
-              <a:lstStyle/>
-              <a:p>
-                <a:endParaRPr lang="en-US" sz="1633" dirty="0"/>
-              </a:p>
-            </p:txBody>
-          </p:sp>
-        </p:grpSp>
-        <p:sp>
-          <p:nvSpPr>
-            <p:cNvPr id="54" name="TextBox 53"/>
-            <p:cNvSpPr txBox="1"/>
-            <p:nvPr/>
-          </p:nvSpPr>
-          <p:spPr>
-            <a:xfrm>
-              <a:off x="36137266" y="18809165"/>
-              <a:ext cx="7558473" cy="1046501"/>
-            </a:xfrm>
-            <a:prstGeom prst="rect">
-              <a:avLst/>
-            </a:prstGeom>
-            <a:noFill/>
-          </p:spPr>
-          <p:txBody>
-            <a:bodyPr wrap="square" rtlCol="0">
-              <a:spAutoFit/>
-            </a:bodyPr>
-            <a:lstStyle/>
-            <a:p>
-              <a:pPr algn="ctr"/>
-              <a:r>
-                <a:rPr lang="en-US" sz="4501" dirty="0">
-                  <a:solidFill>
-                    <a:schemeClr val="bg1"/>
-                  </a:solidFill>
-                </a:rPr>
-                <a:t>Training</a:t>
-              </a:r>
-            </a:p>
-          </p:txBody>
-        </p:sp>
-        <p:sp>
-          <p:nvSpPr>
-            <p:cNvPr id="55" name="TextBox 54"/>
-            <p:cNvSpPr txBox="1"/>
-            <p:nvPr/>
-          </p:nvSpPr>
-          <p:spPr>
-            <a:xfrm>
-              <a:off x="36169648" y="20493439"/>
-              <a:ext cx="7413338" cy="1784916"/>
-            </a:xfrm>
-            <a:prstGeom prst="rect">
-              <a:avLst/>
-            </a:prstGeom>
-            <a:noFill/>
-          </p:spPr>
-          <p:txBody>
-            <a:bodyPr wrap="square" rtlCol="0">
-              <a:spAutoFit/>
-            </a:bodyPr>
-            <a:lstStyle/>
-            <a:p>
-              <a:pPr algn="ctr"/>
-              <a:r>
-                <a:rPr lang="en-US" sz="2700" dirty="0"/>
-                <a:t>Providing </a:t>
-              </a:r>
-              <a:r>
-                <a:rPr lang="en-US" sz="2700" b="1" dirty="0">
-                  <a:hlinkClick r:id="rId4"/>
-                </a:rPr>
-                <a:t>acclaimed training workshops</a:t>
-              </a:r>
-              <a:r>
-                <a:rPr lang="en-US" sz="2700" dirty="0"/>
-                <a:t> that will equip people with in-demand bioinformatics skills</a:t>
-              </a:r>
-            </a:p>
-          </p:txBody>
-        </p:sp>
-      </p:grpSp>
-      <p:grpSp>
-        <p:nvGrpSpPr>
-          <p:cNvPr id="58" name="Group 57"/>
-          <p:cNvGrpSpPr/>
-          <p:nvPr/>
-        </p:nvGrpSpPr>
-        <p:grpSpPr>
-          <a:xfrm>
-            <a:off x="15585272" y="22556070"/>
-            <a:ext cx="5701076" cy="2639303"/>
-            <a:chOff x="35811593" y="7228114"/>
-            <a:chExt cx="7600636" cy="3518702"/>
-          </a:xfrm>
-        </p:grpSpPr>
-        <p:grpSp>
-          <p:nvGrpSpPr>
-            <p:cNvPr id="59" name="Group 58"/>
-            <p:cNvGrpSpPr/>
-            <p:nvPr/>
-          </p:nvGrpSpPr>
-          <p:grpSpPr>
-            <a:xfrm>
-              <a:off x="35843077" y="7228114"/>
-              <a:ext cx="7569152" cy="458112"/>
-              <a:chOff x="35843077" y="7228114"/>
-              <a:chExt cx="6315322" cy="458112"/>
-            </a:xfrm>
-          </p:grpSpPr>
-          <p:sp>
-            <p:nvSpPr>
-              <p:cNvPr id="62" name="TextBox 61"/>
-              <p:cNvSpPr txBox="1"/>
-              <p:nvPr/>
-            </p:nvSpPr>
-            <p:spPr>
-              <a:xfrm>
-                <a:off x="35843077" y="7228114"/>
-                <a:ext cx="6315322" cy="458112"/>
-              </a:xfrm>
-              <a:prstGeom prst="rect">
-                <a:avLst/>
-              </a:prstGeom>
-              <a:noFill/>
-              <a:ln>
-                <a:solidFill>
-                  <a:srgbClr val="002755"/>
-                </a:solidFill>
-              </a:ln>
-            </p:spPr>
-            <p:txBody>
-              <a:bodyPr wrap="square" rtlCol="0">
-                <a:spAutoFit/>
-              </a:bodyPr>
-              <a:lstStyle/>
-              <a:p>
-                <a:endParaRPr lang="en-US" sz="1633" dirty="0"/>
-              </a:p>
-            </p:txBody>
-          </p:sp>
-          <p:sp>
-            <p:nvSpPr>
-              <p:cNvPr id="63" name="TextBox 62"/>
-              <p:cNvSpPr txBox="1"/>
-              <p:nvPr/>
-            </p:nvSpPr>
-            <p:spPr>
-              <a:xfrm>
-                <a:off x="35886620" y="7228114"/>
-                <a:ext cx="6262868" cy="458112"/>
-              </a:xfrm>
-              <a:prstGeom prst="rect">
-                <a:avLst/>
-              </a:prstGeom>
-              <a:solidFill>
-                <a:srgbClr val="002755"/>
-              </a:solidFill>
-            </p:spPr>
-            <p:txBody>
-              <a:bodyPr wrap="square" rtlCol="0">
-                <a:spAutoFit/>
-              </a:bodyPr>
-              <a:lstStyle/>
-              <a:p>
-                <a:endParaRPr lang="en-US" sz="1633" dirty="0"/>
-              </a:p>
-            </p:txBody>
-          </p:sp>
-        </p:grpSp>
-        <p:sp>
-          <p:nvSpPr>
-            <p:cNvPr id="60" name="TextBox 59"/>
-            <p:cNvSpPr txBox="1"/>
-            <p:nvPr/>
-          </p:nvSpPr>
-          <p:spPr>
-            <a:xfrm>
-              <a:off x="35811593" y="7375757"/>
-              <a:ext cx="7589957" cy="1046501"/>
-            </a:xfrm>
-            <a:prstGeom prst="rect">
-              <a:avLst/>
-            </a:prstGeom>
-            <a:noFill/>
-          </p:spPr>
-          <p:txBody>
-            <a:bodyPr wrap="square" rtlCol="0">
-              <a:spAutoFit/>
-            </a:bodyPr>
-            <a:lstStyle/>
-            <a:p>
-              <a:pPr algn="ctr"/>
-              <a:r>
-                <a:rPr lang="en-US" sz="4501" dirty="0">
-                  <a:solidFill>
-                    <a:schemeClr val="bg1"/>
-                  </a:solidFill>
-                </a:rPr>
-                <a:t>Data Analysis</a:t>
-              </a:r>
-            </a:p>
-          </p:txBody>
-        </p:sp>
-        <p:sp>
-          <p:nvSpPr>
-            <p:cNvPr id="61" name="TextBox 60"/>
-            <p:cNvSpPr txBox="1"/>
-            <p:nvPr/>
-          </p:nvSpPr>
-          <p:spPr>
-            <a:xfrm>
-              <a:off x="36060246" y="8961899"/>
-              <a:ext cx="7210673" cy="1784917"/>
-            </a:xfrm>
-            <a:prstGeom prst="rect">
-              <a:avLst/>
-            </a:prstGeom>
-            <a:noFill/>
-          </p:spPr>
-          <p:txBody>
-            <a:bodyPr wrap="square" rtlCol="0">
-              <a:spAutoFit/>
-            </a:bodyPr>
-            <a:lstStyle/>
-            <a:p>
-              <a:pPr algn="ctr"/>
-              <a:r>
-                <a:rPr lang="en-US" sz="2700" b="1" dirty="0">
-                  <a:hlinkClick r:id="rId2"/>
-                </a:rPr>
-                <a:t>Intelligently analyzing data</a:t>
-              </a:r>
-              <a:r>
-                <a:rPr lang="en-US" sz="2700" dirty="0"/>
-                <a:t> from genomics, and other projects, to help drive research forward</a:t>
-              </a:r>
-            </a:p>
-          </p:txBody>
-        </p:sp>
-      </p:grpSp>
-      <p:grpSp>
-        <p:nvGrpSpPr>
-          <p:cNvPr id="64" name="Group 63"/>
-          <p:cNvGrpSpPr/>
-          <p:nvPr/>
-        </p:nvGrpSpPr>
-        <p:grpSpPr>
-          <a:xfrm>
-            <a:off x="22596230" y="22556070"/>
-            <a:ext cx="5721073" cy="2622204"/>
-            <a:chOff x="35837121" y="13317819"/>
-            <a:chExt cx="7627296" cy="3495905"/>
-          </a:xfrm>
-        </p:grpSpPr>
-        <p:grpSp>
-          <p:nvGrpSpPr>
-            <p:cNvPr id="65" name="Group 64"/>
-            <p:cNvGrpSpPr/>
-            <p:nvPr/>
-          </p:nvGrpSpPr>
-          <p:grpSpPr>
-            <a:xfrm>
-              <a:off x="35895265" y="13317819"/>
-              <a:ext cx="7569152" cy="458112"/>
-              <a:chOff x="35843077" y="7228114"/>
-              <a:chExt cx="6315322" cy="458112"/>
-            </a:xfrm>
-          </p:grpSpPr>
-          <p:sp>
-            <p:nvSpPr>
-              <p:cNvPr id="68" name="TextBox 67"/>
-              <p:cNvSpPr txBox="1"/>
-              <p:nvPr/>
-            </p:nvSpPr>
-            <p:spPr>
-              <a:xfrm>
-                <a:off x="35843077" y="7228114"/>
-                <a:ext cx="6315322" cy="458112"/>
-              </a:xfrm>
-              <a:prstGeom prst="rect">
-                <a:avLst/>
-              </a:prstGeom>
-              <a:noFill/>
-              <a:ln>
-                <a:solidFill>
-                  <a:srgbClr val="002755"/>
-                </a:solidFill>
-              </a:ln>
-            </p:spPr>
-            <p:txBody>
-              <a:bodyPr wrap="square" rtlCol="0">
-                <a:spAutoFit/>
-              </a:bodyPr>
-              <a:lstStyle/>
-              <a:p>
-                <a:endParaRPr lang="en-US" sz="1633" dirty="0"/>
-              </a:p>
-            </p:txBody>
-          </p:sp>
-          <p:sp>
-            <p:nvSpPr>
-              <p:cNvPr id="69" name="TextBox 68"/>
-              <p:cNvSpPr txBox="1"/>
-              <p:nvPr/>
-            </p:nvSpPr>
-            <p:spPr>
-              <a:xfrm>
-                <a:off x="35850289" y="7228114"/>
-                <a:ext cx="6308110" cy="458112"/>
-              </a:xfrm>
-              <a:prstGeom prst="rect">
-                <a:avLst/>
-              </a:prstGeom>
-              <a:solidFill>
-                <a:srgbClr val="002755"/>
-              </a:solidFill>
-            </p:spPr>
-            <p:txBody>
-              <a:bodyPr wrap="square" rtlCol="0">
-                <a:spAutoFit/>
-              </a:bodyPr>
-              <a:lstStyle/>
-              <a:p>
-                <a:endParaRPr lang="en-US" sz="1633" dirty="0"/>
-              </a:p>
-            </p:txBody>
-          </p:sp>
-        </p:grpSp>
-        <p:sp>
-          <p:nvSpPr>
-            <p:cNvPr id="66" name="TextBox 65"/>
-            <p:cNvSpPr txBox="1"/>
-            <p:nvPr/>
-          </p:nvSpPr>
-          <p:spPr>
-            <a:xfrm>
-              <a:off x="35837121" y="13419587"/>
-              <a:ext cx="7618648" cy="1046501"/>
-            </a:xfrm>
-            <a:prstGeom prst="rect">
-              <a:avLst/>
-            </a:prstGeom>
-            <a:noFill/>
-          </p:spPr>
-          <p:txBody>
-            <a:bodyPr wrap="square" rtlCol="0">
-              <a:spAutoFit/>
-            </a:bodyPr>
-            <a:lstStyle/>
-            <a:p>
-              <a:pPr algn="ctr"/>
-              <a:r>
-                <a:rPr lang="en-US" sz="4501" dirty="0">
-                  <a:solidFill>
-                    <a:schemeClr val="bg1"/>
-                  </a:solidFill>
-                </a:rPr>
-                <a:t>Research Computing</a:t>
-              </a:r>
-            </a:p>
-          </p:txBody>
-        </p:sp>
-        <p:sp>
-          <p:nvSpPr>
-            <p:cNvPr id="67" name="TextBox 66"/>
-            <p:cNvSpPr txBox="1"/>
-            <p:nvPr/>
-          </p:nvSpPr>
-          <p:spPr>
-            <a:xfrm>
-              <a:off x="36104336" y="15028808"/>
-              <a:ext cx="7210674" cy="1784916"/>
-            </a:xfrm>
-            <a:prstGeom prst="rect">
-              <a:avLst/>
-            </a:prstGeom>
-            <a:noFill/>
-          </p:spPr>
-          <p:txBody>
-            <a:bodyPr wrap="square" rtlCol="0">
-              <a:spAutoFit/>
-            </a:bodyPr>
-            <a:lstStyle/>
-            <a:p>
-              <a:pPr algn="ctr"/>
-              <a:r>
-                <a:rPr lang="en-US" sz="2700" dirty="0"/>
-                <a:t>Helping build </a:t>
-              </a:r>
-              <a:r>
-                <a:rPr lang="en-US" sz="2700" b="1" dirty="0">
-                  <a:hlinkClick r:id="rId3"/>
-                </a:rPr>
-                <a:t>high-performance software and hardware</a:t>
-              </a:r>
-              <a:r>
-                <a:rPr lang="en-US" sz="2700" b="1" dirty="0"/>
-                <a:t> </a:t>
-              </a:r>
-              <a:r>
-                <a:rPr lang="en-US" sz="2700" dirty="0"/>
-                <a:t>bioinformatics solutions</a:t>
-              </a:r>
-            </a:p>
-          </p:txBody>
-        </p:sp>
-      </p:grpSp>
-      <p:grpSp>
-        <p:nvGrpSpPr>
-          <p:cNvPr id="70" name="Group 69"/>
-          <p:cNvGrpSpPr/>
-          <p:nvPr/>
-        </p:nvGrpSpPr>
-        <p:grpSpPr>
-          <a:xfrm>
-            <a:off x="29570150" y="22556072"/>
-            <a:ext cx="5735254" cy="2678500"/>
-            <a:chOff x="36049537" y="18707397"/>
-            <a:chExt cx="7646202" cy="3570958"/>
-          </a:xfrm>
-        </p:grpSpPr>
-        <p:grpSp>
-          <p:nvGrpSpPr>
-            <p:cNvPr id="71" name="Group 70"/>
-            <p:cNvGrpSpPr/>
-            <p:nvPr/>
-          </p:nvGrpSpPr>
-          <p:grpSpPr>
-            <a:xfrm>
-              <a:off x="36049537" y="18707397"/>
-              <a:ext cx="7631216" cy="458112"/>
-              <a:chOff x="35791294" y="7228114"/>
-              <a:chExt cx="6367105" cy="458112"/>
-            </a:xfrm>
-          </p:grpSpPr>
-          <p:sp>
-            <p:nvSpPr>
-              <p:cNvPr id="74" name="TextBox 73"/>
-              <p:cNvSpPr txBox="1"/>
-              <p:nvPr/>
-            </p:nvSpPr>
-            <p:spPr>
-              <a:xfrm>
-                <a:off x="35843077" y="7228114"/>
-                <a:ext cx="6315322" cy="458112"/>
-              </a:xfrm>
-              <a:prstGeom prst="rect">
-                <a:avLst/>
-              </a:prstGeom>
-              <a:noFill/>
-              <a:ln>
-                <a:solidFill>
-                  <a:srgbClr val="002755"/>
-                </a:solidFill>
-              </a:ln>
-            </p:spPr>
-            <p:txBody>
-              <a:bodyPr wrap="square" rtlCol="0">
-                <a:spAutoFit/>
-              </a:bodyPr>
-              <a:lstStyle/>
-              <a:p>
-                <a:endParaRPr lang="en-US" sz="1633" dirty="0"/>
-              </a:p>
-            </p:txBody>
-          </p:sp>
-          <p:sp>
-            <p:nvSpPr>
-              <p:cNvPr id="75" name="TextBox 74"/>
-              <p:cNvSpPr txBox="1"/>
-              <p:nvPr/>
-            </p:nvSpPr>
-            <p:spPr>
-              <a:xfrm>
-                <a:off x="35791294" y="7228114"/>
-                <a:ext cx="6358194" cy="458112"/>
-              </a:xfrm>
-              <a:prstGeom prst="rect">
-                <a:avLst/>
-              </a:prstGeom>
-              <a:solidFill>
-                <a:srgbClr val="002755"/>
-              </a:solidFill>
-            </p:spPr>
-            <p:txBody>
-              <a:bodyPr wrap="square" rtlCol="0">
-                <a:spAutoFit/>
-              </a:bodyPr>
-              <a:lstStyle/>
-              <a:p>
-                <a:endParaRPr lang="en-US" sz="1633" dirty="0"/>
-              </a:p>
-            </p:txBody>
-          </p:sp>
-        </p:grpSp>
-        <p:sp>
-          <p:nvSpPr>
-            <p:cNvPr id="72" name="TextBox 71"/>
-            <p:cNvSpPr txBox="1"/>
-            <p:nvPr/>
-          </p:nvSpPr>
-          <p:spPr>
-            <a:xfrm>
-              <a:off x="36137266" y="18809165"/>
-              <a:ext cx="7558473" cy="1046501"/>
-            </a:xfrm>
-            <a:prstGeom prst="rect">
-              <a:avLst/>
-            </a:prstGeom>
-            <a:noFill/>
-          </p:spPr>
-          <p:txBody>
-            <a:bodyPr wrap="square" rtlCol="0">
-              <a:spAutoFit/>
-            </a:bodyPr>
-            <a:lstStyle/>
-            <a:p>
-              <a:pPr algn="ctr"/>
-              <a:r>
-                <a:rPr lang="en-US" sz="4501" dirty="0">
-                  <a:solidFill>
-                    <a:schemeClr val="bg1"/>
-                  </a:solidFill>
-                </a:rPr>
-                <a:t>Training</a:t>
-              </a:r>
-            </a:p>
-          </p:txBody>
-        </p:sp>
-        <p:sp>
-          <p:nvSpPr>
-            <p:cNvPr id="73" name="TextBox 72"/>
-            <p:cNvSpPr txBox="1"/>
-            <p:nvPr/>
-          </p:nvSpPr>
-          <p:spPr>
-            <a:xfrm>
-              <a:off x="36169648" y="20493439"/>
-              <a:ext cx="7413338" cy="1784916"/>
-            </a:xfrm>
-            <a:prstGeom prst="rect">
-              <a:avLst/>
-            </a:prstGeom>
-            <a:noFill/>
-          </p:spPr>
-          <p:txBody>
-            <a:bodyPr wrap="square" rtlCol="0">
-              <a:spAutoFit/>
-            </a:bodyPr>
-            <a:lstStyle/>
-            <a:p>
-              <a:pPr algn="ctr"/>
-              <a:r>
-                <a:rPr lang="en-US" sz="2700" dirty="0"/>
-                <a:t>Providing </a:t>
-              </a:r>
-              <a:r>
-                <a:rPr lang="en-US" sz="2700" b="1" dirty="0">
-                  <a:hlinkClick r:id="rId4"/>
-                </a:rPr>
-                <a:t>acclaimed training workshops</a:t>
-              </a:r>
-              <a:r>
-                <a:rPr lang="en-US" sz="2700" dirty="0"/>
-                <a:t> that will equip people with in-demand bioinformatics skills</a:t>
-              </a:r>
-            </a:p>
-          </p:txBody>
-        </p:sp>
-      </p:grpSp>
-      <p:grpSp>
-        <p:nvGrpSpPr>
-          <p:cNvPr id="79" name="Group 78"/>
-          <p:cNvGrpSpPr/>
-          <p:nvPr/>
-        </p:nvGrpSpPr>
-        <p:grpSpPr>
-          <a:xfrm>
-            <a:off x="2954063" y="4884916"/>
-            <a:ext cx="6836250" cy="350632"/>
-            <a:chOff x="35848901" y="7228114"/>
-            <a:chExt cx="6316345" cy="1260012"/>
-          </a:xfrm>
-        </p:grpSpPr>
-        <p:sp>
-          <p:nvSpPr>
-            <p:cNvPr id="83" name="TextBox 82"/>
-            <p:cNvSpPr txBox="1"/>
-            <p:nvPr/>
-          </p:nvSpPr>
-          <p:spPr>
-            <a:xfrm>
-              <a:off x="35848901" y="7228114"/>
-              <a:ext cx="6300756" cy="1234814"/>
-            </a:xfrm>
-            <a:prstGeom prst="rect">
-              <a:avLst/>
-            </a:prstGeom>
-            <a:solidFill>
-              <a:srgbClr val="002755"/>
-            </a:solidFill>
-          </p:spPr>
-          <p:txBody>
-            <a:bodyPr wrap="square" rtlCol="0">
-              <a:spAutoFit/>
-            </a:bodyPr>
-            <a:lstStyle/>
-            <a:p>
-              <a:endParaRPr lang="en-US" sz="1633" dirty="0"/>
-            </a:p>
-          </p:txBody>
-        </p:sp>
-        <p:sp>
-          <p:nvSpPr>
-            <p:cNvPr id="94" name="TextBox 93"/>
-            <p:cNvSpPr txBox="1"/>
-            <p:nvPr/>
-          </p:nvSpPr>
-          <p:spPr>
-            <a:xfrm>
-              <a:off x="35864490" y="7253312"/>
-              <a:ext cx="6300756" cy="1234814"/>
-            </a:xfrm>
-            <a:prstGeom prst="rect">
-              <a:avLst/>
-            </a:prstGeom>
-            <a:solidFill>
-              <a:srgbClr val="002755"/>
-            </a:solidFill>
-          </p:spPr>
-          <p:txBody>
-            <a:bodyPr wrap="square" rtlCol="0">
-              <a:spAutoFit/>
-            </a:bodyPr>
-            <a:lstStyle/>
-            <a:p>
-              <a:endParaRPr lang="en-US" sz="1633" dirty="0"/>
-            </a:p>
-          </p:txBody>
-        </p:sp>
-      </p:grpSp>
-      <p:sp>
-        <p:nvSpPr>
-          <p:cNvPr id="80" name="TextBox 79"/>
-          <p:cNvSpPr txBox="1"/>
-          <p:nvPr/>
-        </p:nvSpPr>
-        <p:spPr>
-          <a:xfrm>
-            <a:off x="2956290" y="4884917"/>
-            <a:ext cx="6825499" cy="369332"/>
-          </a:xfrm>
-          <a:prstGeom prst="rect">
-            <a:avLst/>
-          </a:prstGeom>
-          <a:noFill/>
-        </p:spPr>
-        <p:txBody>
-          <a:bodyPr wrap="square" rtlCol="0">
-            <a:spAutoFit/>
-          </a:bodyPr>
-          <a:lstStyle/>
-          <a:p>
-            <a:pPr algn="ctr"/>
-            <a:r>
-              <a:rPr lang="en-US" dirty="0">
-                <a:solidFill>
-                  <a:schemeClr val="bg1"/>
-                </a:solidFill>
-              </a:rPr>
-              <a:t>Training</a:t>
-            </a:r>
-          </a:p>
-        </p:txBody>
-      </p:sp>
-      <p:grpSp>
-        <p:nvGrpSpPr>
-          <p:cNvPr id="95" name="Group 94"/>
-          <p:cNvGrpSpPr/>
-          <p:nvPr/>
-        </p:nvGrpSpPr>
-        <p:grpSpPr>
-          <a:xfrm>
-            <a:off x="2937191" y="2046455"/>
-            <a:ext cx="6836250" cy="350632"/>
-            <a:chOff x="35848901" y="7228114"/>
-            <a:chExt cx="6316345" cy="1260012"/>
-          </a:xfrm>
-        </p:grpSpPr>
-        <p:sp>
-          <p:nvSpPr>
-            <p:cNvPr id="96" name="TextBox 95"/>
-            <p:cNvSpPr txBox="1"/>
-            <p:nvPr/>
-          </p:nvSpPr>
-          <p:spPr>
-            <a:xfrm>
-              <a:off x="35848901" y="7228114"/>
-              <a:ext cx="6300756" cy="1234814"/>
-            </a:xfrm>
-            <a:prstGeom prst="rect">
-              <a:avLst/>
-            </a:prstGeom>
-            <a:solidFill>
-              <a:srgbClr val="002755"/>
-            </a:solidFill>
-          </p:spPr>
-          <p:txBody>
-            <a:bodyPr wrap="square" rtlCol="0">
-              <a:spAutoFit/>
-            </a:bodyPr>
-            <a:lstStyle/>
-            <a:p>
-              <a:endParaRPr lang="en-US" sz="1633" dirty="0"/>
-            </a:p>
-          </p:txBody>
-        </p:sp>
-        <p:sp>
-          <p:nvSpPr>
-            <p:cNvPr id="97" name="TextBox 96"/>
-            <p:cNvSpPr txBox="1"/>
-            <p:nvPr/>
-          </p:nvSpPr>
-          <p:spPr>
-            <a:xfrm>
-              <a:off x="35864490" y="7253312"/>
-              <a:ext cx="6300756" cy="1234814"/>
-            </a:xfrm>
-            <a:prstGeom prst="rect">
-              <a:avLst/>
-            </a:prstGeom>
-            <a:solidFill>
-              <a:srgbClr val="002755"/>
-            </a:solidFill>
-          </p:spPr>
-          <p:txBody>
-            <a:bodyPr wrap="square" rtlCol="0">
-              <a:spAutoFit/>
-            </a:bodyPr>
-            <a:lstStyle/>
-            <a:p>
-              <a:endParaRPr lang="en-US" sz="1633" dirty="0"/>
-            </a:p>
-          </p:txBody>
-        </p:sp>
-      </p:grpSp>
-      <p:sp>
-        <p:nvSpPr>
-          <p:cNvPr id="98" name="TextBox 97"/>
-          <p:cNvSpPr txBox="1"/>
-          <p:nvPr/>
-        </p:nvSpPr>
-        <p:spPr>
-          <a:xfrm>
-            <a:off x="2939417" y="2046456"/>
-            <a:ext cx="6825499" cy="369332"/>
-          </a:xfrm>
-          <a:prstGeom prst="rect">
-            <a:avLst/>
-          </a:prstGeom>
-          <a:noFill/>
-        </p:spPr>
-        <p:txBody>
-          <a:bodyPr wrap="square" rtlCol="0">
-            <a:spAutoFit/>
-          </a:bodyPr>
-          <a:lstStyle/>
-          <a:p>
-            <a:pPr algn="ctr"/>
-            <a:r>
-              <a:rPr lang="en-US" dirty="0">
-                <a:solidFill>
-                  <a:schemeClr val="bg1"/>
-                </a:solidFill>
-              </a:rPr>
-              <a:t>Data Analysis</a:t>
-            </a:r>
-          </a:p>
-        </p:txBody>
-      </p:sp>
-      <p:grpSp>
-        <p:nvGrpSpPr>
-          <p:cNvPr id="99" name="Group 98"/>
-          <p:cNvGrpSpPr/>
-          <p:nvPr/>
-        </p:nvGrpSpPr>
-        <p:grpSpPr>
-          <a:xfrm>
-            <a:off x="2934965" y="3571499"/>
-            <a:ext cx="6836250" cy="350632"/>
-            <a:chOff x="35848901" y="7228114"/>
-            <a:chExt cx="6316345" cy="1260012"/>
-          </a:xfrm>
-        </p:grpSpPr>
-        <p:sp>
-          <p:nvSpPr>
-            <p:cNvPr id="100" name="TextBox 99"/>
-            <p:cNvSpPr txBox="1"/>
-            <p:nvPr/>
-          </p:nvSpPr>
-          <p:spPr>
-            <a:xfrm>
-              <a:off x="35848901" y="7228114"/>
-              <a:ext cx="6300756" cy="1234814"/>
-            </a:xfrm>
-            <a:prstGeom prst="rect">
-              <a:avLst/>
-            </a:prstGeom>
-            <a:solidFill>
-              <a:srgbClr val="002755"/>
-            </a:solidFill>
-          </p:spPr>
-          <p:txBody>
-            <a:bodyPr wrap="square" rtlCol="0">
-              <a:spAutoFit/>
-            </a:bodyPr>
-            <a:lstStyle/>
-            <a:p>
-              <a:endParaRPr lang="en-US" sz="1633" dirty="0"/>
-            </a:p>
-          </p:txBody>
-        </p:sp>
-        <p:sp>
-          <p:nvSpPr>
-            <p:cNvPr id="101" name="TextBox 100"/>
-            <p:cNvSpPr txBox="1"/>
-            <p:nvPr/>
-          </p:nvSpPr>
-          <p:spPr>
-            <a:xfrm>
-              <a:off x="35864490" y="7253312"/>
-              <a:ext cx="6300756" cy="1234814"/>
-            </a:xfrm>
-            <a:prstGeom prst="rect">
-              <a:avLst/>
-            </a:prstGeom>
-            <a:solidFill>
-              <a:srgbClr val="002755"/>
-            </a:solidFill>
-          </p:spPr>
-          <p:txBody>
-            <a:bodyPr wrap="square" rtlCol="0">
-              <a:spAutoFit/>
-            </a:bodyPr>
-            <a:lstStyle/>
-            <a:p>
-              <a:endParaRPr lang="en-US" sz="1633" dirty="0"/>
-            </a:p>
-          </p:txBody>
-        </p:sp>
-      </p:grpSp>
-      <p:sp>
-        <p:nvSpPr>
-          <p:cNvPr id="102" name="TextBox 101"/>
-          <p:cNvSpPr txBox="1"/>
-          <p:nvPr/>
-        </p:nvSpPr>
-        <p:spPr>
-          <a:xfrm>
-            <a:off x="2937191" y="3571499"/>
-            <a:ext cx="6825499" cy="369332"/>
-          </a:xfrm>
-          <a:prstGeom prst="rect">
-            <a:avLst/>
-          </a:prstGeom>
-          <a:noFill/>
-        </p:spPr>
-        <p:txBody>
-          <a:bodyPr wrap="square" rtlCol="0">
-            <a:spAutoFit/>
-          </a:bodyPr>
-          <a:lstStyle/>
-          <a:p>
-            <a:pPr algn="ctr"/>
-            <a:r>
-              <a:rPr lang="en-US" dirty="0">
-                <a:solidFill>
-                  <a:schemeClr val="bg1"/>
-                </a:solidFill>
-              </a:rPr>
-              <a:t>Research Computing</a:t>
-            </a:r>
-          </a:p>
-        </p:txBody>
-      </p:sp>
-      <p:sp>
-        <p:nvSpPr>
-          <p:cNvPr id="3" name="TextBox 2"/>
-          <p:cNvSpPr txBox="1"/>
-          <p:nvPr/>
-        </p:nvSpPr>
-        <p:spPr>
-          <a:xfrm>
-            <a:off x="2951836" y="2461218"/>
-            <a:ext cx="6819379" cy="846194"/>
-          </a:xfrm>
-          <a:prstGeom prst="rect">
-            <a:avLst/>
-          </a:prstGeom>
-          <a:noFill/>
-        </p:spPr>
-        <p:txBody>
-          <a:bodyPr wrap="square" rtlCol="0">
-            <a:spAutoFit/>
-          </a:bodyPr>
-          <a:lstStyle/>
-          <a:p>
-            <a:r>
-              <a:rPr lang="en-US" sz="1633" dirty="0"/>
-              <a:t>The Bioinformatics Core promotes experimental design, advanced computation and informatics analysis of </a:t>
-            </a:r>
-            <a:r>
-              <a:rPr lang="en-US" sz="1633" dirty="0" err="1"/>
-              <a:t>omics</a:t>
-            </a:r>
-            <a:r>
-              <a:rPr lang="en-US" sz="1633" dirty="0"/>
-              <a:t> scale datasets that drives research forward.</a:t>
-            </a:r>
-          </a:p>
-        </p:txBody>
-      </p:sp>
-      <p:sp>
-        <p:nvSpPr>
-          <p:cNvPr id="103" name="TextBox 102"/>
-          <p:cNvSpPr txBox="1"/>
-          <p:nvPr/>
-        </p:nvSpPr>
-        <p:spPr>
-          <a:xfrm>
-            <a:off x="2934964" y="4052958"/>
-            <a:ext cx="6819379" cy="594906"/>
-          </a:xfrm>
-          <a:prstGeom prst="rect">
-            <a:avLst/>
-          </a:prstGeom>
-          <a:noFill/>
-        </p:spPr>
-        <p:txBody>
-          <a:bodyPr wrap="square" rtlCol="0">
-            <a:spAutoFit/>
-          </a:bodyPr>
-          <a:lstStyle/>
-          <a:p>
-            <a:r>
-              <a:rPr lang="en-US" sz="1633" dirty="0"/>
-              <a:t>Maintain and make available high-performance computing hardware and software necessary for todays data-intensive bioinformatic analyses.</a:t>
-            </a:r>
-          </a:p>
-        </p:txBody>
-      </p:sp>
-      <p:sp>
-        <p:nvSpPr>
-          <p:cNvPr id="104" name="TextBox 103"/>
-          <p:cNvSpPr txBox="1"/>
-          <p:nvPr/>
-        </p:nvSpPr>
-        <p:spPr>
-          <a:xfrm>
-            <a:off x="2970934" y="5340036"/>
-            <a:ext cx="6819379" cy="846194"/>
-          </a:xfrm>
-          <a:prstGeom prst="rect">
-            <a:avLst/>
-          </a:prstGeom>
-          <a:noFill/>
-        </p:spPr>
-        <p:txBody>
-          <a:bodyPr wrap="square" rtlCol="0">
-            <a:spAutoFit/>
-          </a:bodyPr>
-          <a:lstStyle/>
-          <a:p>
-            <a:r>
-              <a:rPr lang="en-US" sz="1633"/>
-              <a:t>The Core helps to educate the next generation of bioinformaticians through highly acclaimed training workshops, seminars and through direct participation in research activities.</a:t>
-            </a:r>
-          </a:p>
-        </p:txBody>
-      </p:sp>
-    </p:spTree>
-    <p:extLst>
-      <p:ext uri="{BB962C8B-B14F-4D97-AF65-F5344CB8AC3E}">
-        <p14:creationId xmlns:p14="http://schemas.microsoft.com/office/powerpoint/2010/main" val="2128135498"/>
       </p:ext>
     </p:extLst>
   </p:cSld>

</xml_diff>